<commit_message>
prenstation ajout diagrame classe
</commit_message>
<xml_diff>
--- a/src/doc/Presentation.pptx
+++ b/src/doc/Presentation.pptx
@@ -5,17 +5,18 @@
     <p:sldMasterId id="2147483678" r:id="rId1"/>
   </p:sldMasterIdLst>
   <p:notesMasterIdLst>
-    <p:notesMasterId r:id="rId7"/>
+    <p:notesMasterId r:id="rId8"/>
   </p:notesMasterIdLst>
   <p:handoutMasterIdLst>
-    <p:handoutMasterId r:id="rId8"/>
+    <p:handoutMasterId r:id="rId9"/>
   </p:handoutMasterIdLst>
   <p:sldIdLst>
     <p:sldId id="256" r:id="rId2"/>
     <p:sldId id="266" r:id="rId3"/>
     <p:sldId id="267" r:id="rId4"/>
     <p:sldId id="268" r:id="rId5"/>
-    <p:sldId id="269" r:id="rId6"/>
+    <p:sldId id="270" r:id="rId6"/>
+    <p:sldId id="269" r:id="rId7"/>
   </p:sldIdLst>
   <p:sldSz cx="10080625" cy="5670550"/>
   <p:notesSz cx="7559675" cy="10691813"/>
@@ -351,7 +352,7 @@
               <a:defRPr sz="1400"/>
             </a:pPr>
             <a:fld id="{BB81FF6F-5CD1-440B-AC4E-9AFEBA5DE460}" type="slidenum">
-              <a:t>‹N°›</a:t>
+              <a:t>‹#›</a:t>
             </a:fld>
             <a:endParaRPr lang="fr-FR" sz="1400" b="0" i="0" u="none" strike="noStrike" kern="1200" cap="none">
               <a:ln>
@@ -626,7 +627,7 @@
           <a:p>
             <a:pPr lvl="0"/>
             <a:fld id="{F3236682-260E-4365-9737-DF91F8E20D49}" type="slidenum">
-              <a:t>‹N°›</a:t>
+              <a:t>‹#›</a:t>
             </a:fld>
             <a:endParaRPr lang="fr-FR"/>
           </a:p>
@@ -1066,7 +1067,7 @@
             <a:pPr lvl="0"/>
             <a:fld id="{9649BE05-80C0-4F5D-A59A-AD1C36333321}" type="slidenum">
               <a:rPr lang="fr-FR" smtClean="0"/>
-              <a:t>‹N°›</a:t>
+              <a:t>‹#›</a:t>
             </a:fld>
             <a:endParaRPr lang="fr-FR"/>
           </a:p>
@@ -1340,7 +1341,7 @@
             <a:pPr lvl="0"/>
             <a:fld id="{09BAF25F-67C0-4BB9-A6A6-573DC6A8271F}" type="slidenum">
               <a:rPr lang="fr-FR" smtClean="0"/>
-              <a:t>‹N°›</a:t>
+              <a:t>‹#›</a:t>
             </a:fld>
             <a:endParaRPr lang="fr-FR"/>
           </a:p>
@@ -1533,7 +1534,7 @@
             <a:pPr lvl="0"/>
             <a:fld id="{09BAF25F-67C0-4BB9-A6A6-573DC6A8271F}" type="slidenum">
               <a:rPr lang="fr-FR" smtClean="0"/>
-              <a:t>‹N°›</a:t>
+              <a:t>‹#›</a:t>
             </a:fld>
             <a:endParaRPr lang="fr-FR"/>
           </a:p>
@@ -1800,7 +1801,7 @@
             <a:pPr lvl="0"/>
             <a:fld id="{09BAF25F-67C0-4BB9-A6A6-573DC6A8271F}" type="slidenum">
               <a:rPr lang="fr-FR" smtClean="0"/>
-              <a:t>‹N°›</a:t>
+              <a:t>‹#›</a:t>
             </a:fld>
             <a:endParaRPr lang="fr-FR"/>
           </a:p>
@@ -2131,7 +2132,7 @@
             <a:pPr lvl="0"/>
             <a:fld id="{09BAF25F-67C0-4BB9-A6A6-573DC6A8271F}" type="slidenum">
               <a:rPr lang="fr-FR" smtClean="0"/>
-              <a:t>‹N°›</a:t>
+              <a:t>‹#›</a:t>
             </a:fld>
             <a:endParaRPr lang="fr-FR"/>
           </a:p>
@@ -2740,7 +2741,7 @@
             <a:pPr lvl="0"/>
             <a:fld id="{09BAF25F-67C0-4BB9-A6A6-573DC6A8271F}" type="slidenum">
               <a:rPr lang="fr-FR" smtClean="0"/>
-              <a:t>‹N°›</a:t>
+              <a:t>‹#›</a:t>
             </a:fld>
             <a:endParaRPr lang="fr-FR"/>
           </a:p>
@@ -3586,7 +3587,7 @@
             <a:pPr lvl="0"/>
             <a:fld id="{09BAF25F-67C0-4BB9-A6A6-573DC6A8271F}" type="slidenum">
               <a:rPr lang="fr-FR" smtClean="0"/>
-              <a:t>‹N°›</a:t>
+              <a:t>‹#›</a:t>
             </a:fld>
             <a:endParaRPr lang="fr-FR"/>
           </a:p>
@@ -3755,7 +3756,7 @@
             <a:pPr lvl="0"/>
             <a:fld id="{B374A85B-8FEB-4CE9-A5A8-FCCD1AEDEE4C}" type="slidenum">
               <a:rPr lang="fr-FR" smtClean="0"/>
-              <a:t>‹N°›</a:t>
+              <a:t>‹#›</a:t>
             </a:fld>
             <a:endParaRPr lang="fr-FR"/>
           </a:p>
@@ -3934,7 +3935,7 @@
             <a:pPr lvl="0"/>
             <a:fld id="{DA0D5121-BE0B-4385-BCFF-557E423999BB}" type="slidenum">
               <a:rPr lang="fr-FR" smtClean="0"/>
-              <a:t>‹N°›</a:t>
+              <a:t>‹#›</a:t>
             </a:fld>
             <a:endParaRPr lang="fr-FR"/>
           </a:p>
@@ -4103,7 +4104,7 @@
             <a:pPr lvl="0"/>
             <a:fld id="{E891F078-9BD1-471A-AC17-805DE0E1BD60}" type="slidenum">
               <a:rPr lang="fr-FR" smtClean="0"/>
-              <a:t>‹N°›</a:t>
+              <a:t>‹#›</a:t>
             </a:fld>
             <a:endParaRPr lang="fr-FR"/>
           </a:p>
@@ -4346,7 +4347,7 @@
             <a:pPr lvl="0"/>
             <a:fld id="{AD4DB2A1-0249-42F9-9F42-F5E777229685}" type="slidenum">
               <a:rPr lang="fr-FR" smtClean="0"/>
-              <a:t>‹N°›</a:t>
+              <a:t>‹#›</a:t>
             </a:fld>
             <a:endParaRPr lang="fr-FR"/>
           </a:p>
@@ -4637,7 +4638,7 @@
             <a:pPr lvl="0"/>
             <a:fld id="{586F2033-F00C-49ED-8263-6805B0B5F85E}" type="slidenum">
               <a:rPr lang="fr-FR" smtClean="0"/>
-              <a:t>‹N°›</a:t>
+              <a:t>‹#›</a:t>
             </a:fld>
             <a:endParaRPr lang="fr-FR"/>
           </a:p>
@@ -5074,7 +5075,7 @@
             <a:pPr lvl="0"/>
             <a:fld id="{9787D8C8-EE0F-488B-AB61-D15756DE3C2B}" type="slidenum">
               <a:rPr lang="fr-FR" smtClean="0"/>
-              <a:t>‹N°›</a:t>
+              <a:t>‹#›</a:t>
             </a:fld>
             <a:endParaRPr lang="fr-FR"/>
           </a:p>
@@ -5191,7 +5192,7 @@
             <a:pPr lvl="0"/>
             <a:fld id="{4AD58FB7-BEB4-4625-8EE8-20FD8B70E2B0}" type="slidenum">
               <a:rPr lang="fr-FR" smtClean="0"/>
-              <a:t>‹N°›</a:t>
+              <a:t>‹#›</a:t>
             </a:fld>
             <a:endParaRPr lang="fr-FR"/>
           </a:p>
@@ -5285,7 +5286,7 @@
             <a:pPr lvl="0"/>
             <a:fld id="{486E90A9-5F54-4E07-B4A9-E162926D45B5}" type="slidenum">
               <a:rPr lang="fr-FR" smtClean="0"/>
-              <a:t>‹N°›</a:t>
+              <a:t>‹#›</a:t>
             </a:fld>
             <a:endParaRPr lang="fr-FR"/>
           </a:p>
@@ -5563,7 +5564,7 @@
             <a:pPr lvl="0"/>
             <a:fld id="{B7D8BA86-01B9-4173-A15F-8A97FB0AEA48}" type="slidenum">
               <a:rPr lang="fr-FR" smtClean="0"/>
-              <a:t>‹N°›</a:t>
+              <a:t>‹#›</a:t>
             </a:fld>
             <a:endParaRPr lang="fr-FR"/>
           </a:p>
@@ -5837,7 +5838,7 @@
             <a:pPr lvl="0"/>
             <a:fld id="{F85C4D1E-6C8B-456E-A8CA-9191569DE2B9}" type="slidenum">
               <a:rPr lang="fr-FR" smtClean="0"/>
-              <a:t>‹N°›</a:t>
+              <a:t>‹#›</a:t>
             </a:fld>
             <a:endParaRPr lang="fr-FR"/>
           </a:p>
@@ -6302,7 +6303,7 @@
             <a:pPr lvl="0"/>
             <a:fld id="{09BAF25F-67C0-4BB9-A6A6-573DC6A8271F}" type="slidenum">
               <a:rPr lang="fr-FR" smtClean="0"/>
-              <a:t>‹N°›</a:t>
+              <a:t>‹#›</a:t>
             </a:fld>
             <a:endParaRPr lang="fr-FR"/>
           </a:p>
@@ -7365,13 +7366,7 @@
       </p:grpSpPr>
       <p:sp>
         <p:nvSpPr>
-          <p:cNvPr id="2" name="Espace réservé du numéro de diapositive 1">
-            <a:extLst>
-              <a:ext uri="{FF2B5EF4-FFF2-40B4-BE49-F238E27FC236}">
-                <a16:creationId xmlns:a16="http://schemas.microsoft.com/office/drawing/2014/main" id="{902F169C-E116-40A9-84FA-070A9EC410C2}"/>
-              </a:ext>
-            </a:extLst>
-          </p:cNvPr>
+          <p:cNvPr id="2" name="Slide Number Placeholder 1"/>
           <p:cNvSpPr>
             <a:spLocks noGrp="1"/>
           </p:cNvSpPr>
@@ -7393,22 +7388,40 @@
           </a:p>
         </p:txBody>
       </p:sp>
-      <p:sp>
-        <p:nvSpPr>
-          <p:cNvPr id="4" name="ZoneTexte 3">
-            <a:extLst>
-              <a:ext uri="{FF2B5EF4-FFF2-40B4-BE49-F238E27FC236}">
-                <a16:creationId xmlns:a16="http://schemas.microsoft.com/office/drawing/2014/main" id="{2F022CE1-11F1-425B-8DA3-9EE5C2F7A1F9}"/>
-              </a:ext>
-            </a:extLst>
-          </p:cNvPr>
+      <p:pic>
+        <p:nvPicPr>
+          <p:cNvPr id="5" name="Picture 4"/>
+          <p:cNvPicPr>
+            <a:picLocks noChangeAspect="1"/>
+          </p:cNvPicPr>
+          <p:nvPr/>
+        </p:nvPicPr>
+        <p:blipFill>
+          <a:blip r:embed="rId2"/>
+          <a:stretch>
+            <a:fillRect/>
+          </a:stretch>
+        </p:blipFill>
+        <p:spPr>
+          <a:xfrm>
+            <a:off x="1" y="748145"/>
+            <a:ext cx="8559717" cy="5094245"/>
+          </a:xfrm>
+          <a:prstGeom prst="rect">
+            <a:avLst/>
+          </a:prstGeom>
+        </p:spPr>
+      </p:pic>
+      <p:sp>
+        <p:nvSpPr>
+          <p:cNvPr id="6" name="TextBox 5"/>
           <p:cNvSpPr txBox="1"/>
           <p:nvPr/>
         </p:nvSpPr>
         <p:spPr>
           <a:xfrm>
-            <a:off x="-2742" y="59859"/>
-            <a:ext cx="5043054" cy="923330"/>
+            <a:off x="0" y="0"/>
+            <a:ext cx="4628763" cy="646331"/>
           </a:xfrm>
           <a:prstGeom prst="rect">
             <a:avLst/>
@@ -7416,30 +7429,140 @@
           <a:noFill/>
         </p:spPr>
         <p:txBody>
+          <a:bodyPr wrap="square" rtlCol="0">
+            <a:spAutoFit/>
+          </a:bodyPr>
+          <a:lstStyle/>
+          <a:p>
+            <a:r>
+              <a:rPr lang="fr-CA" dirty="0" smtClean="0">
+                <a:latin typeface="Arial" panose="020B0604020202020204" pitchFamily="34" charset="0"/>
+                <a:cs typeface="Arial" panose="020B0604020202020204" pitchFamily="34" charset="0"/>
+              </a:rPr>
+              <a:t>III. Ébauche </a:t>
+            </a:r>
+            <a:r>
+              <a:rPr lang="fr-CA" dirty="0">
+                <a:latin typeface="Arial" panose="020B0604020202020204" pitchFamily="34" charset="0"/>
+                <a:cs typeface="Arial" panose="020B0604020202020204" pitchFamily="34" charset="0"/>
+              </a:rPr>
+              <a:t>de diagramme de classe</a:t>
+            </a:r>
+          </a:p>
+          <a:p>
+            <a:endParaRPr lang="en-US" dirty="0"/>
+          </a:p>
+        </p:txBody>
+      </p:sp>
+    </p:spTree>
+    <p:extLst>
+      <p:ext uri="{BB962C8B-B14F-4D97-AF65-F5344CB8AC3E}">
+        <p14:creationId xmlns:p14="http://schemas.microsoft.com/office/powerpoint/2010/main" val="3478150435"/>
+      </p:ext>
+    </p:extLst>
+  </p:cSld>
+  <p:clrMapOvr>
+    <a:masterClrMapping/>
+  </p:clrMapOvr>
+</p:sld>
+</file>
+
+<file path=ppt/slides/slide6.xml><?xml version="1.0" encoding="utf-8"?>
+<p:sld xmlns:a="http://schemas.openxmlformats.org/drawingml/2006/main" xmlns:r="http://schemas.openxmlformats.org/officeDocument/2006/relationships" xmlns:p="http://schemas.openxmlformats.org/presentationml/2006/main">
+  <p:cSld>
+    <p:spTree>
+      <p:nvGrpSpPr>
+        <p:cNvPr id="1" name=""/>
+        <p:cNvGrpSpPr/>
+        <p:nvPr/>
+      </p:nvGrpSpPr>
+      <p:grpSpPr>
+        <a:xfrm>
+          <a:off x="0" y="0"/>
+          <a:ext cx="0" cy="0"/>
+          <a:chOff x="0" y="0"/>
+          <a:chExt cx="0" cy="0"/>
+        </a:xfrm>
+      </p:grpSpPr>
+      <p:sp>
+        <p:nvSpPr>
+          <p:cNvPr id="2" name="Espace réservé du numéro de diapositive 1">
+            <a:extLst>
+              <a:ext uri="{FF2B5EF4-FFF2-40B4-BE49-F238E27FC236}">
+                <a16:creationId xmlns:a16="http://schemas.microsoft.com/office/drawing/2014/main" xmlns="" id="{902F169C-E116-40A9-84FA-070A9EC410C2}"/>
+              </a:ext>
+            </a:extLst>
+          </p:cNvPr>
+          <p:cNvSpPr>
+            <a:spLocks noGrp="1"/>
+          </p:cNvSpPr>
+          <p:nvPr>
+            <p:ph type="sldNum" sz="quarter" idx="12"/>
+          </p:nvPr>
+        </p:nvSpPr>
+        <p:spPr/>
+        <p:txBody>
+          <a:bodyPr/>
+          <a:lstStyle/>
+          <a:p>
+            <a:pPr lvl="0"/>
+            <a:fld id="{486E90A9-5F54-4E07-B4A9-E162926D45B5}" type="slidenum">
+              <a:rPr lang="fr-FR" smtClean="0"/>
+              <a:t>6</a:t>
+            </a:fld>
+            <a:endParaRPr lang="fr-FR"/>
+          </a:p>
+        </p:txBody>
+      </p:sp>
+      <p:sp>
+        <p:nvSpPr>
+          <p:cNvPr id="4" name="ZoneTexte 3">
+            <a:extLst>
+              <a:ext uri="{FF2B5EF4-FFF2-40B4-BE49-F238E27FC236}">
+                <a16:creationId xmlns:a16="http://schemas.microsoft.com/office/drawing/2014/main" xmlns="" id="{2F022CE1-11F1-425B-8DA3-9EE5C2F7A1F9}"/>
+              </a:ext>
+            </a:extLst>
+          </p:cNvPr>
+          <p:cNvSpPr txBox="1"/>
+          <p:nvPr/>
+        </p:nvSpPr>
+        <p:spPr>
+          <a:xfrm>
+            <a:off x="-2742" y="59859"/>
+            <a:ext cx="5043054" cy="369332"/>
+          </a:xfrm>
+          <a:prstGeom prst="rect">
+            <a:avLst/>
+          </a:prstGeom>
+          <a:noFill/>
+        </p:spPr>
+        <p:txBody>
           <a:bodyPr wrap="square">
             <a:spAutoFit/>
           </a:bodyPr>
           <a:lstStyle/>
           <a:p>
-            <a:pPr marL="400050" indent="-400050">
-              <a:buFont typeface="+mj-lt"/>
-              <a:buAutoNum type="romanUcPeriod" startAt="3"/>
-            </a:pPr>
-            <a:r>
-              <a:rPr lang="fr-CA" sz="1800" dirty="0">
+            <a:r>
+              <a:rPr lang="fr-CA" dirty="0" smtClean="0">
                 <a:latin typeface="Arial" panose="020B0604020202020204" pitchFamily="34" charset="0"/>
                 <a:cs typeface="Arial" panose="020B0604020202020204" pitchFamily="34" charset="0"/>
               </a:rPr>
-              <a:t>Ébauche de diagramme de classe</a:t>
-            </a:r>
-          </a:p>
-          <a:p>
-            <a:endParaRPr lang="fr-CA" dirty="0">
-              <a:latin typeface="Arial" panose="020B0604020202020204" pitchFamily="34" charset="0"/>
-              <a:cs typeface="Arial" panose="020B0604020202020204" pitchFamily="34" charset="0"/>
-            </a:endParaRPr>
-          </a:p>
-          <a:p>
+              <a:t>IV.</a:t>
+            </a:r>
+            <a:r>
+              <a:rPr lang="fr-CA" dirty="0">
+                <a:latin typeface="Arial" panose="020B0604020202020204" pitchFamily="34" charset="0"/>
+                <a:cs typeface="Arial" panose="020B0604020202020204" pitchFamily="34" charset="0"/>
+              </a:rPr>
+              <a:t> Ébauche de diagramme </a:t>
+            </a:r>
+            <a:r>
+              <a:rPr lang="fr-CA" dirty="0" smtClean="0">
+                <a:latin typeface="Arial" panose="020B0604020202020204" pitchFamily="34" charset="0"/>
+                <a:cs typeface="Arial" panose="020B0604020202020204" pitchFamily="34" charset="0"/>
+              </a:rPr>
+              <a:t>de cas d’utilisation</a:t>
+            </a:r>
             <a:endParaRPr lang="fr-CA" sz="1800" dirty="0">
               <a:latin typeface="Arial" panose="020B0604020202020204" pitchFamily="34" charset="0"/>
               <a:cs typeface="Arial" panose="020B0604020202020204" pitchFamily="34" charset="0"/>
@@ -7452,7 +7575,7 @@
           <p:cNvPr id="6" name="Image 5">
             <a:extLst>
               <a:ext uri="{FF2B5EF4-FFF2-40B4-BE49-F238E27FC236}">
-                <a16:creationId xmlns:a16="http://schemas.microsoft.com/office/drawing/2014/main" id="{7D02857C-A8FB-42F4-8CC3-0A92E7CD9A2B}"/>
+                <a16:creationId xmlns:a16="http://schemas.microsoft.com/office/drawing/2014/main" xmlns="" id="{7D02857C-A8FB-42F4-8CC3-0A92E7CD9A2B}"/>
               </a:ext>
             </a:extLst>
           </p:cNvPr>

</xml_diff>

<commit_message>
modif deux diagramme et PPT
</commit_message>
<xml_diff>
--- a/src/doc/Presentation.pptx
+++ b/src/doc/Presentation.pptx
@@ -352,7 +352,7 @@
               <a:defRPr sz="1400"/>
             </a:pPr>
             <a:fld id="{BB81FF6F-5CD1-440B-AC4E-9AFEBA5DE460}" type="slidenum">
-              <a:t>‹#›</a:t>
+              <a:t>‹N°›</a:t>
             </a:fld>
             <a:endParaRPr lang="fr-FR" sz="1400" b="0" i="0" u="none" strike="noStrike" kern="1200" cap="none">
               <a:ln>
@@ -627,7 +627,7 @@
           <a:p>
             <a:pPr lvl="0"/>
             <a:fld id="{F3236682-260E-4365-9737-DF91F8E20D49}" type="slidenum">
-              <a:t>‹#›</a:t>
+              <a:t>‹N°›</a:t>
             </a:fld>
             <a:endParaRPr lang="fr-FR"/>
           </a:p>
@@ -1067,7 +1067,7 @@
             <a:pPr lvl="0"/>
             <a:fld id="{9649BE05-80C0-4F5D-A59A-AD1C36333321}" type="slidenum">
               <a:rPr lang="fr-FR" smtClean="0"/>
-              <a:t>‹#›</a:t>
+              <a:t>‹N°›</a:t>
             </a:fld>
             <a:endParaRPr lang="fr-FR"/>
           </a:p>
@@ -1341,7 +1341,7 @@
             <a:pPr lvl="0"/>
             <a:fld id="{09BAF25F-67C0-4BB9-A6A6-573DC6A8271F}" type="slidenum">
               <a:rPr lang="fr-FR" smtClean="0"/>
-              <a:t>‹#›</a:t>
+              <a:t>‹N°›</a:t>
             </a:fld>
             <a:endParaRPr lang="fr-FR"/>
           </a:p>
@@ -1534,7 +1534,7 @@
             <a:pPr lvl="0"/>
             <a:fld id="{09BAF25F-67C0-4BB9-A6A6-573DC6A8271F}" type="slidenum">
               <a:rPr lang="fr-FR" smtClean="0"/>
-              <a:t>‹#›</a:t>
+              <a:t>‹N°›</a:t>
             </a:fld>
             <a:endParaRPr lang="fr-FR"/>
           </a:p>
@@ -1801,7 +1801,7 @@
             <a:pPr lvl="0"/>
             <a:fld id="{09BAF25F-67C0-4BB9-A6A6-573DC6A8271F}" type="slidenum">
               <a:rPr lang="fr-FR" smtClean="0"/>
-              <a:t>‹#›</a:t>
+              <a:t>‹N°›</a:t>
             </a:fld>
             <a:endParaRPr lang="fr-FR"/>
           </a:p>
@@ -2132,7 +2132,7 @@
             <a:pPr lvl="0"/>
             <a:fld id="{09BAF25F-67C0-4BB9-A6A6-573DC6A8271F}" type="slidenum">
               <a:rPr lang="fr-FR" smtClean="0"/>
-              <a:t>‹#›</a:t>
+              <a:t>‹N°›</a:t>
             </a:fld>
             <a:endParaRPr lang="fr-FR"/>
           </a:p>
@@ -2741,7 +2741,7 @@
             <a:pPr lvl="0"/>
             <a:fld id="{09BAF25F-67C0-4BB9-A6A6-573DC6A8271F}" type="slidenum">
               <a:rPr lang="fr-FR" smtClean="0"/>
-              <a:t>‹#›</a:t>
+              <a:t>‹N°›</a:t>
             </a:fld>
             <a:endParaRPr lang="fr-FR"/>
           </a:p>
@@ -3587,7 +3587,7 @@
             <a:pPr lvl="0"/>
             <a:fld id="{09BAF25F-67C0-4BB9-A6A6-573DC6A8271F}" type="slidenum">
               <a:rPr lang="fr-FR" smtClean="0"/>
-              <a:t>‹#›</a:t>
+              <a:t>‹N°›</a:t>
             </a:fld>
             <a:endParaRPr lang="fr-FR"/>
           </a:p>
@@ -3756,7 +3756,7 @@
             <a:pPr lvl="0"/>
             <a:fld id="{B374A85B-8FEB-4CE9-A5A8-FCCD1AEDEE4C}" type="slidenum">
               <a:rPr lang="fr-FR" smtClean="0"/>
-              <a:t>‹#›</a:t>
+              <a:t>‹N°›</a:t>
             </a:fld>
             <a:endParaRPr lang="fr-FR"/>
           </a:p>
@@ -3935,7 +3935,7 @@
             <a:pPr lvl="0"/>
             <a:fld id="{DA0D5121-BE0B-4385-BCFF-557E423999BB}" type="slidenum">
               <a:rPr lang="fr-FR" smtClean="0"/>
-              <a:t>‹#›</a:t>
+              <a:t>‹N°›</a:t>
             </a:fld>
             <a:endParaRPr lang="fr-FR"/>
           </a:p>
@@ -4104,7 +4104,7 @@
             <a:pPr lvl="0"/>
             <a:fld id="{E891F078-9BD1-471A-AC17-805DE0E1BD60}" type="slidenum">
               <a:rPr lang="fr-FR" smtClean="0"/>
-              <a:t>‹#›</a:t>
+              <a:t>‹N°›</a:t>
             </a:fld>
             <a:endParaRPr lang="fr-FR"/>
           </a:p>
@@ -4347,7 +4347,7 @@
             <a:pPr lvl="0"/>
             <a:fld id="{AD4DB2A1-0249-42F9-9F42-F5E777229685}" type="slidenum">
               <a:rPr lang="fr-FR" smtClean="0"/>
-              <a:t>‹#›</a:t>
+              <a:t>‹N°›</a:t>
             </a:fld>
             <a:endParaRPr lang="fr-FR"/>
           </a:p>
@@ -4638,7 +4638,7 @@
             <a:pPr lvl="0"/>
             <a:fld id="{586F2033-F00C-49ED-8263-6805B0B5F85E}" type="slidenum">
               <a:rPr lang="fr-FR" smtClean="0"/>
-              <a:t>‹#›</a:t>
+              <a:t>‹N°›</a:t>
             </a:fld>
             <a:endParaRPr lang="fr-FR"/>
           </a:p>
@@ -5075,7 +5075,7 @@
             <a:pPr lvl="0"/>
             <a:fld id="{9787D8C8-EE0F-488B-AB61-D15756DE3C2B}" type="slidenum">
               <a:rPr lang="fr-FR" smtClean="0"/>
-              <a:t>‹#›</a:t>
+              <a:t>‹N°›</a:t>
             </a:fld>
             <a:endParaRPr lang="fr-FR"/>
           </a:p>
@@ -5192,7 +5192,7 @@
             <a:pPr lvl="0"/>
             <a:fld id="{4AD58FB7-BEB4-4625-8EE8-20FD8B70E2B0}" type="slidenum">
               <a:rPr lang="fr-FR" smtClean="0"/>
-              <a:t>‹#›</a:t>
+              <a:t>‹N°›</a:t>
             </a:fld>
             <a:endParaRPr lang="fr-FR"/>
           </a:p>
@@ -5286,7 +5286,7 @@
             <a:pPr lvl="0"/>
             <a:fld id="{486E90A9-5F54-4E07-B4A9-E162926D45B5}" type="slidenum">
               <a:rPr lang="fr-FR" smtClean="0"/>
-              <a:t>‹#›</a:t>
+              <a:t>‹N°›</a:t>
             </a:fld>
             <a:endParaRPr lang="fr-FR"/>
           </a:p>
@@ -5564,7 +5564,7 @@
             <a:pPr lvl="0"/>
             <a:fld id="{B7D8BA86-01B9-4173-A15F-8A97FB0AEA48}" type="slidenum">
               <a:rPr lang="fr-FR" smtClean="0"/>
-              <a:t>‹#›</a:t>
+              <a:t>‹N°›</a:t>
             </a:fld>
             <a:endParaRPr lang="fr-FR"/>
           </a:p>
@@ -5838,7 +5838,7 @@
             <a:pPr lvl="0"/>
             <a:fld id="{F85C4D1E-6C8B-456E-A8CA-9191569DE2B9}" type="slidenum">
               <a:rPr lang="fr-FR" smtClean="0"/>
-              <a:t>‹#›</a:t>
+              <a:t>‹N°›</a:t>
             </a:fld>
             <a:endParaRPr lang="fr-FR"/>
           </a:p>
@@ -6303,7 +6303,7 @@
             <a:pPr lvl="0"/>
             <a:fld id="{09BAF25F-67C0-4BB9-A6A6-573DC6A8271F}" type="slidenum">
               <a:rPr lang="fr-FR" smtClean="0"/>
-              <a:t>‹#›</a:t>
+              <a:t>‹N°›</a:t>
             </a:fld>
             <a:endParaRPr lang="fr-FR"/>
           </a:p>
@@ -7388,9 +7388,50 @@
           </a:p>
         </p:txBody>
       </p:sp>
+      <p:sp>
+        <p:nvSpPr>
+          <p:cNvPr id="6" name="TextBox 5"/>
+          <p:cNvSpPr txBox="1"/>
+          <p:nvPr/>
+        </p:nvSpPr>
+        <p:spPr>
+          <a:xfrm>
+            <a:off x="0" y="0"/>
+            <a:ext cx="4628763" cy="646331"/>
+          </a:xfrm>
+          <a:prstGeom prst="rect">
+            <a:avLst/>
+          </a:prstGeom>
+          <a:noFill/>
+        </p:spPr>
+        <p:txBody>
+          <a:bodyPr wrap="square" rtlCol="0">
+            <a:spAutoFit/>
+          </a:bodyPr>
+          <a:lstStyle/>
+          <a:p>
+            <a:r>
+              <a:rPr lang="fr-CA" dirty="0">
+                <a:latin typeface="Arial" panose="020B0604020202020204" pitchFamily="34" charset="0"/>
+                <a:cs typeface="Arial" panose="020B0604020202020204" pitchFamily="34" charset="0"/>
+              </a:rPr>
+              <a:t>III. Ébauche de diagramme de classe</a:t>
+            </a:r>
+          </a:p>
+          <a:p>
+            <a:endParaRPr lang="en-US" dirty="0"/>
+          </a:p>
+        </p:txBody>
+      </p:sp>
       <p:pic>
         <p:nvPicPr>
-          <p:cNvPr id="5" name="Picture 4"/>
+          <p:cNvPr id="4" name="Image 3">
+            <a:extLst>
+              <a:ext uri="{FF2B5EF4-FFF2-40B4-BE49-F238E27FC236}">
+                <a16:creationId xmlns:a16="http://schemas.microsoft.com/office/drawing/2014/main" id="{764084CC-B11A-4299-A8A0-15B00DAC4018}"/>
+              </a:ext>
+            </a:extLst>
+          </p:cNvPr>
           <p:cNvPicPr>
             <a:picLocks noChangeAspect="1"/>
           </p:cNvPicPr>
@@ -7404,56 +7445,14 @@
         </p:blipFill>
         <p:spPr>
           <a:xfrm>
-            <a:off x="1" y="748145"/>
-            <a:ext cx="8559717" cy="5094245"/>
+            <a:off x="254154" y="561906"/>
+            <a:ext cx="8305564" cy="5024219"/>
           </a:xfrm>
           <a:prstGeom prst="rect">
             <a:avLst/>
           </a:prstGeom>
         </p:spPr>
       </p:pic>
-      <p:sp>
-        <p:nvSpPr>
-          <p:cNvPr id="6" name="TextBox 5"/>
-          <p:cNvSpPr txBox="1"/>
-          <p:nvPr/>
-        </p:nvSpPr>
-        <p:spPr>
-          <a:xfrm>
-            <a:off x="0" y="0"/>
-            <a:ext cx="4628763" cy="646331"/>
-          </a:xfrm>
-          <a:prstGeom prst="rect">
-            <a:avLst/>
-          </a:prstGeom>
-          <a:noFill/>
-        </p:spPr>
-        <p:txBody>
-          <a:bodyPr wrap="square" rtlCol="0">
-            <a:spAutoFit/>
-          </a:bodyPr>
-          <a:lstStyle/>
-          <a:p>
-            <a:r>
-              <a:rPr lang="fr-CA" dirty="0" smtClean="0">
-                <a:latin typeface="Arial" panose="020B0604020202020204" pitchFamily="34" charset="0"/>
-                <a:cs typeface="Arial" panose="020B0604020202020204" pitchFamily="34" charset="0"/>
-              </a:rPr>
-              <a:t>III. Ébauche </a:t>
-            </a:r>
-            <a:r>
-              <a:rPr lang="fr-CA" dirty="0">
-                <a:latin typeface="Arial" panose="020B0604020202020204" pitchFamily="34" charset="0"/>
-                <a:cs typeface="Arial" panose="020B0604020202020204" pitchFamily="34" charset="0"/>
-              </a:rPr>
-              <a:t>de diagramme de classe</a:t>
-            </a:r>
-          </a:p>
-          <a:p>
-            <a:endParaRPr lang="en-US" dirty="0"/>
-          </a:p>
-        </p:txBody>
-      </p:sp>
     </p:spTree>
     <p:extLst>
       <p:ext uri="{BB962C8B-B14F-4D97-AF65-F5344CB8AC3E}">
@@ -7489,7 +7488,7 @@
           <p:cNvPr id="2" name="Espace réservé du numéro de diapositive 1">
             <a:extLst>
               <a:ext uri="{FF2B5EF4-FFF2-40B4-BE49-F238E27FC236}">
-                <a16:creationId xmlns:a16="http://schemas.microsoft.com/office/drawing/2014/main" xmlns="" id="{902F169C-E116-40A9-84FA-070A9EC410C2}"/>
+                <a16:creationId xmlns:a16="http://schemas.microsoft.com/office/drawing/2014/main" id="{902F169C-E116-40A9-84FA-070A9EC410C2}"/>
               </a:ext>
             </a:extLst>
           </p:cNvPr>
@@ -7519,7 +7518,7 @@
           <p:cNvPr id="4" name="ZoneTexte 3">
             <a:extLst>
               <a:ext uri="{FF2B5EF4-FFF2-40B4-BE49-F238E27FC236}">
-                <a16:creationId xmlns:a16="http://schemas.microsoft.com/office/drawing/2014/main" xmlns="" id="{2F022CE1-11F1-425B-8DA3-9EE5C2F7A1F9}"/>
+                <a16:creationId xmlns:a16="http://schemas.microsoft.com/office/drawing/2014/main" id="{2F022CE1-11F1-425B-8DA3-9EE5C2F7A1F9}"/>
               </a:ext>
             </a:extLst>
           </p:cNvPr>
@@ -7543,25 +7542,11 @@
           <a:lstStyle/>
           <a:p>
             <a:r>
-              <a:rPr lang="fr-CA" dirty="0" smtClean="0">
-                <a:latin typeface="Arial" panose="020B0604020202020204" pitchFamily="34" charset="0"/>
-                <a:cs typeface="Arial" panose="020B0604020202020204" pitchFamily="34" charset="0"/>
-              </a:rPr>
-              <a:t>IV.</a:t>
-            </a:r>
-            <a:r>
               <a:rPr lang="fr-CA" dirty="0">
                 <a:latin typeface="Arial" panose="020B0604020202020204" pitchFamily="34" charset="0"/>
                 <a:cs typeface="Arial" panose="020B0604020202020204" pitchFamily="34" charset="0"/>
               </a:rPr>
-              <a:t> Ébauche de diagramme </a:t>
-            </a:r>
-            <a:r>
-              <a:rPr lang="fr-CA" dirty="0" smtClean="0">
-                <a:latin typeface="Arial" panose="020B0604020202020204" pitchFamily="34" charset="0"/>
-                <a:cs typeface="Arial" panose="020B0604020202020204" pitchFamily="34" charset="0"/>
-              </a:rPr>
-              <a:t>de cas d’utilisation</a:t>
+              <a:t>IV. Ébauche de diagramme de cas d’utilisation</a:t>
             </a:r>
             <a:endParaRPr lang="fr-CA" sz="1800" dirty="0">
               <a:latin typeface="Arial" panose="020B0604020202020204" pitchFamily="34" charset="0"/>
@@ -7572,10 +7557,10 @@
       </p:sp>
       <p:pic>
         <p:nvPicPr>
-          <p:cNvPr id="6" name="Image 5">
+          <p:cNvPr id="5" name="Image 4">
             <a:extLst>
               <a:ext uri="{FF2B5EF4-FFF2-40B4-BE49-F238E27FC236}">
-                <a16:creationId xmlns:a16="http://schemas.microsoft.com/office/drawing/2014/main" xmlns="" id="{7D02857C-A8FB-42F4-8CC3-0A92E7CD9A2B}"/>
+                <a16:creationId xmlns:a16="http://schemas.microsoft.com/office/drawing/2014/main" id="{95AD4C39-A1D7-4E49-B291-99F1AA84A540}"/>
               </a:ext>
             </a:extLst>
           </p:cNvPr>
@@ -7592,8 +7577,8 @@
         </p:blipFill>
         <p:spPr>
           <a:xfrm>
-            <a:off x="2496252" y="1152403"/>
-            <a:ext cx="5088120" cy="3365744"/>
+            <a:off x="1947587" y="583362"/>
+            <a:ext cx="6185449" cy="4503825"/>
           </a:xfrm>
           <a:prstGeom prst="rect">
             <a:avLst/>

</xml_diff>